<commit_message>
revised, code added for binary tree
</commit_message>
<xml_diff>
--- a/DSA07-Tree/figures/figures.pptx
+++ b/DSA07-Tree/figures/figures.pptx
@@ -5,7 +5,7 @@
     <p:sldMasterId id="2147483648" r:id="rId1"/>
   </p:sldMasterIdLst>
   <p:notesMasterIdLst>
-    <p:notesMasterId r:id="rId41"/>
+    <p:notesMasterId r:id="rId42"/>
   </p:notesMasterIdLst>
   <p:sldIdLst>
     <p:sldId id="256" r:id="rId2"/>
@@ -47,6 +47,7 @@
     <p:sldId id="292" r:id="rId38"/>
     <p:sldId id="293" r:id="rId39"/>
     <p:sldId id="294" r:id="rId40"/>
+    <p:sldId id="296" r:id="rId41"/>
   </p:sldIdLst>
   <p:sldSz cx="12192000" cy="6858000"/>
   <p:notesSz cx="6858000" cy="9144000"/>
@@ -235,7 +236,7 @@
           <a:p>
             <a:fld id="{584920C7-C25A-664B-9A52-492C7F15B7FA}" type="datetimeFigureOut">
               <a:rPr lang="en-US" smtClean="0"/>
-              <a:t>4/21/17</a:t>
+              <a:t>4/26/17</a:t>
             </a:fld>
             <a:endParaRPr lang="en-US"/>
           </a:p>
@@ -634,7 +635,7 @@
           <a:p>
             <a:fld id="{0E479A5B-CC94-9547-97CB-F1593DCBBC82}" type="datetimeFigureOut">
               <a:rPr lang="en-US" smtClean="0"/>
-              <a:t>4/21/17</a:t>
+              <a:t>4/26/17</a:t>
             </a:fld>
             <a:endParaRPr lang="en-US"/>
           </a:p>
@@ -804,7 +805,7 @@
           <a:p>
             <a:fld id="{0E479A5B-CC94-9547-97CB-F1593DCBBC82}" type="datetimeFigureOut">
               <a:rPr lang="en-US" smtClean="0"/>
-              <a:t>4/21/17</a:t>
+              <a:t>4/26/17</a:t>
             </a:fld>
             <a:endParaRPr lang="en-US"/>
           </a:p>
@@ -984,7 +985,7 @@
           <a:p>
             <a:fld id="{0E479A5B-CC94-9547-97CB-F1593DCBBC82}" type="datetimeFigureOut">
               <a:rPr lang="en-US" smtClean="0"/>
-              <a:t>4/21/17</a:t>
+              <a:t>4/26/17</a:t>
             </a:fld>
             <a:endParaRPr lang="en-US"/>
           </a:p>
@@ -1154,7 +1155,7 @@
           <a:p>
             <a:fld id="{0E479A5B-CC94-9547-97CB-F1593DCBBC82}" type="datetimeFigureOut">
               <a:rPr lang="en-US" smtClean="0"/>
-              <a:t>4/21/17</a:t>
+              <a:t>4/26/17</a:t>
             </a:fld>
             <a:endParaRPr lang="en-US"/>
           </a:p>
@@ -1400,7 +1401,7 @@
           <a:p>
             <a:fld id="{0E479A5B-CC94-9547-97CB-F1593DCBBC82}" type="datetimeFigureOut">
               <a:rPr lang="en-US" smtClean="0"/>
-              <a:t>4/21/17</a:t>
+              <a:t>4/26/17</a:t>
             </a:fld>
             <a:endParaRPr lang="en-US"/>
           </a:p>
@@ -1632,7 +1633,7 @@
           <a:p>
             <a:fld id="{0E479A5B-CC94-9547-97CB-F1593DCBBC82}" type="datetimeFigureOut">
               <a:rPr lang="en-US" smtClean="0"/>
-              <a:t>4/21/17</a:t>
+              <a:t>4/26/17</a:t>
             </a:fld>
             <a:endParaRPr lang="en-US"/>
           </a:p>
@@ -1999,7 +2000,7 @@
           <a:p>
             <a:fld id="{0E479A5B-CC94-9547-97CB-F1593DCBBC82}" type="datetimeFigureOut">
               <a:rPr lang="en-US" smtClean="0"/>
-              <a:t>4/21/17</a:t>
+              <a:t>4/26/17</a:t>
             </a:fld>
             <a:endParaRPr lang="en-US"/>
           </a:p>
@@ -2117,7 +2118,7 @@
           <a:p>
             <a:fld id="{0E479A5B-CC94-9547-97CB-F1593DCBBC82}" type="datetimeFigureOut">
               <a:rPr lang="en-US" smtClean="0"/>
-              <a:t>4/21/17</a:t>
+              <a:t>4/26/17</a:t>
             </a:fld>
             <a:endParaRPr lang="en-US"/>
           </a:p>
@@ -2212,7 +2213,7 @@
           <a:p>
             <a:fld id="{0E479A5B-CC94-9547-97CB-F1593DCBBC82}" type="datetimeFigureOut">
               <a:rPr lang="en-US" smtClean="0"/>
-              <a:t>4/21/17</a:t>
+              <a:t>4/26/17</a:t>
             </a:fld>
             <a:endParaRPr lang="en-US"/>
           </a:p>
@@ -2489,7 +2490,7 @@
           <a:p>
             <a:fld id="{0E479A5B-CC94-9547-97CB-F1593DCBBC82}" type="datetimeFigureOut">
               <a:rPr lang="en-US" smtClean="0"/>
-              <a:t>4/21/17</a:t>
+              <a:t>4/26/17</a:t>
             </a:fld>
             <a:endParaRPr lang="en-US"/>
           </a:p>
@@ -2742,7 +2743,7 @@
           <a:p>
             <a:fld id="{0E479A5B-CC94-9547-97CB-F1593DCBBC82}" type="datetimeFigureOut">
               <a:rPr lang="en-US" smtClean="0"/>
-              <a:t>4/21/17</a:t>
+              <a:t>4/26/17</a:t>
             </a:fld>
             <a:endParaRPr lang="en-US"/>
           </a:p>
@@ -2955,7 +2956,7 @@
           <a:p>
             <a:fld id="{0E479A5B-CC94-9547-97CB-F1593DCBBC82}" type="datetimeFigureOut">
               <a:rPr lang="en-US" smtClean="0"/>
-              <a:t>4/21/17</a:t>
+              <a:t>4/26/17</a:t>
             </a:fld>
             <a:endParaRPr lang="en-US"/>
           </a:p>
@@ -45822,11 +45823,6 @@
               </a:rPr>
               <a:t>4</a:t>
             </a:r>
-            <a:endParaRPr lang="en-US" dirty="0">
-              <a:solidFill>
-                <a:schemeClr val="tx1"/>
-              </a:solidFill>
-            </a:endParaRPr>
           </a:p>
         </p:txBody>
       </p:sp>
@@ -57287,15 +57283,7 @@
                   <a:schemeClr val="tx1"/>
                 </a:solidFill>
               </a:rPr>
-              <a:t>5</a:t>
-            </a:r>
-            <a:r>
-              <a:rPr lang="en-US" dirty="0" smtClean="0">
-                <a:solidFill>
-                  <a:schemeClr val="tx1"/>
-                </a:solidFill>
-              </a:rPr>
-              <a:t>2</a:t>
+              <a:t>52</a:t>
             </a:r>
             <a:endParaRPr lang="en-US" dirty="0">
               <a:solidFill>
@@ -59770,6 +59758,1172 @@
 </p:sld>
 </file>
 
+<file path=ppt/slides/slide40.xml><?xml version="1.0" encoding="utf-8"?>
+<p:sld xmlns:a="http://schemas.openxmlformats.org/drawingml/2006/main" xmlns:r="http://schemas.openxmlformats.org/officeDocument/2006/relationships" xmlns:p="http://schemas.openxmlformats.org/presentationml/2006/main">
+  <p:cSld>
+    <p:spTree>
+      <p:nvGrpSpPr>
+        <p:cNvPr id="1" name=""/>
+        <p:cNvGrpSpPr/>
+        <p:nvPr/>
+      </p:nvGrpSpPr>
+      <p:grpSpPr>
+        <a:xfrm>
+          <a:off x="0" y="0"/>
+          <a:ext cx="0" cy="0"/>
+          <a:chOff x="0" y="0"/>
+          <a:chExt cx="0" cy="0"/>
+        </a:xfrm>
+      </p:grpSpPr>
+      <p:sp>
+        <p:nvSpPr>
+          <p:cNvPr id="92" name="Rectangle 91"/>
+          <p:cNvSpPr/>
+          <p:nvPr/>
+        </p:nvSpPr>
+        <p:spPr>
+          <a:xfrm>
+            <a:off x="568034" y="374073"/>
+            <a:ext cx="9531930" cy="5717293"/>
+          </a:xfrm>
+          <a:prstGeom prst="rect">
+            <a:avLst/>
+          </a:prstGeom>
+          <a:ln>
+            <a:noFill/>
+          </a:ln>
+        </p:spPr>
+        <p:style>
+          <a:lnRef idx="2">
+            <a:schemeClr val="accent6"/>
+          </a:lnRef>
+          <a:fillRef idx="1">
+            <a:schemeClr val="lt1"/>
+          </a:fillRef>
+          <a:effectRef idx="0">
+            <a:schemeClr val="accent6"/>
+          </a:effectRef>
+          <a:fontRef idx="minor">
+            <a:schemeClr val="dk1"/>
+          </a:fontRef>
+        </p:style>
+        <p:txBody>
+          <a:bodyPr rtlCol="0" anchor="ctr"/>
+          <a:lstStyle/>
+          <a:p>
+            <a:pPr algn="ctr"/>
+            <a:endParaRPr lang="en-US"/>
+          </a:p>
+        </p:txBody>
+      </p:sp>
+      <p:sp>
+        <p:nvSpPr>
+          <p:cNvPr id="4" name="Oval 3"/>
+          <p:cNvSpPr/>
+          <p:nvPr/>
+        </p:nvSpPr>
+        <p:spPr>
+          <a:xfrm>
+            <a:off x="720436" y="5043055"/>
+            <a:ext cx="914400" cy="914400"/>
+          </a:xfrm>
+          <a:prstGeom prst="ellipse">
+            <a:avLst/>
+          </a:prstGeom>
+          <a:ln w="28575">
+            <a:solidFill>
+              <a:schemeClr val="tx1"/>
+            </a:solidFill>
+          </a:ln>
+        </p:spPr>
+        <p:style>
+          <a:lnRef idx="2">
+            <a:schemeClr val="accent6"/>
+          </a:lnRef>
+          <a:fillRef idx="1">
+            <a:schemeClr val="lt1"/>
+          </a:fillRef>
+          <a:effectRef idx="0">
+            <a:schemeClr val="accent6"/>
+          </a:effectRef>
+          <a:fontRef idx="minor">
+            <a:schemeClr val="dk1"/>
+          </a:fontRef>
+        </p:style>
+        <p:txBody>
+          <a:bodyPr rtlCol="0" anchor="ctr"/>
+          <a:lstStyle/>
+          <a:p>
+            <a:pPr algn="ctr"/>
+            <a:r>
+              <a:rPr lang="en-US" dirty="0"/>
+              <a:t>K</a:t>
+            </a:r>
+          </a:p>
+        </p:txBody>
+      </p:sp>
+      <p:sp>
+        <p:nvSpPr>
+          <p:cNvPr id="5" name="Oval 4"/>
+          <p:cNvSpPr/>
+          <p:nvPr/>
+        </p:nvSpPr>
+        <p:spPr>
+          <a:xfrm>
+            <a:off x="1939636" y="5043055"/>
+            <a:ext cx="914400" cy="914400"/>
+          </a:xfrm>
+          <a:prstGeom prst="ellipse">
+            <a:avLst/>
+          </a:prstGeom>
+          <a:ln w="28575">
+            <a:solidFill>
+              <a:schemeClr val="tx1"/>
+            </a:solidFill>
+          </a:ln>
+        </p:spPr>
+        <p:style>
+          <a:lnRef idx="2">
+            <a:schemeClr val="accent6"/>
+          </a:lnRef>
+          <a:fillRef idx="1">
+            <a:schemeClr val="lt1"/>
+          </a:fillRef>
+          <a:effectRef idx="0">
+            <a:schemeClr val="accent6"/>
+          </a:effectRef>
+          <a:fontRef idx="minor">
+            <a:schemeClr val="dk1"/>
+          </a:fontRef>
+        </p:style>
+        <p:txBody>
+          <a:bodyPr rtlCol="0" anchor="ctr"/>
+          <a:lstStyle/>
+          <a:p>
+            <a:pPr algn="ctr"/>
+            <a:r>
+              <a:rPr lang="en-US" dirty="0" smtClean="0"/>
+              <a:t>L</a:t>
+            </a:r>
+            <a:endParaRPr lang="en-US" dirty="0"/>
+          </a:p>
+        </p:txBody>
+      </p:sp>
+      <p:sp>
+        <p:nvSpPr>
+          <p:cNvPr id="8" name="Oval 7"/>
+          <p:cNvSpPr/>
+          <p:nvPr/>
+        </p:nvSpPr>
+        <p:spPr>
+          <a:xfrm>
+            <a:off x="4946072" y="5043055"/>
+            <a:ext cx="914400" cy="914400"/>
+          </a:xfrm>
+          <a:prstGeom prst="ellipse">
+            <a:avLst/>
+          </a:prstGeom>
+          <a:ln w="28575">
+            <a:solidFill>
+              <a:schemeClr val="tx1"/>
+            </a:solidFill>
+          </a:ln>
+        </p:spPr>
+        <p:style>
+          <a:lnRef idx="2">
+            <a:schemeClr val="accent6"/>
+          </a:lnRef>
+          <a:fillRef idx="1">
+            <a:schemeClr val="lt1"/>
+          </a:fillRef>
+          <a:effectRef idx="0">
+            <a:schemeClr val="accent6"/>
+          </a:effectRef>
+          <a:fontRef idx="minor">
+            <a:schemeClr val="dk1"/>
+          </a:fontRef>
+        </p:style>
+        <p:txBody>
+          <a:bodyPr rtlCol="0" anchor="ctr"/>
+          <a:lstStyle/>
+          <a:p>
+            <a:pPr algn="ctr"/>
+            <a:r>
+              <a:rPr lang="en-US" dirty="0" smtClean="0"/>
+              <a:t>M</a:t>
+            </a:r>
+            <a:endParaRPr lang="en-US" dirty="0"/>
+          </a:p>
+        </p:txBody>
+      </p:sp>
+      <p:sp>
+        <p:nvSpPr>
+          <p:cNvPr id="12" name="Oval 11"/>
+          <p:cNvSpPr/>
+          <p:nvPr/>
+        </p:nvSpPr>
+        <p:spPr>
+          <a:xfrm>
+            <a:off x="1288472" y="3629892"/>
+            <a:ext cx="914400" cy="914400"/>
+          </a:xfrm>
+          <a:prstGeom prst="ellipse">
+            <a:avLst/>
+          </a:prstGeom>
+          <a:ln w="28575">
+            <a:solidFill>
+              <a:schemeClr val="tx1"/>
+            </a:solidFill>
+          </a:ln>
+        </p:spPr>
+        <p:style>
+          <a:lnRef idx="2">
+            <a:schemeClr val="accent6"/>
+          </a:lnRef>
+          <a:fillRef idx="1">
+            <a:schemeClr val="lt1"/>
+          </a:fillRef>
+          <a:effectRef idx="0">
+            <a:schemeClr val="accent6"/>
+          </a:effectRef>
+          <a:fontRef idx="minor">
+            <a:schemeClr val="dk1"/>
+          </a:fontRef>
+        </p:style>
+        <p:txBody>
+          <a:bodyPr rtlCol="0" anchor="ctr"/>
+          <a:lstStyle/>
+          <a:p>
+            <a:pPr algn="ctr"/>
+            <a:r>
+              <a:rPr lang="en-US" dirty="0" smtClean="0"/>
+              <a:t>E</a:t>
+            </a:r>
+            <a:endParaRPr lang="en-US" dirty="0"/>
+          </a:p>
+        </p:txBody>
+      </p:sp>
+      <p:sp>
+        <p:nvSpPr>
+          <p:cNvPr id="13" name="Oval 12"/>
+          <p:cNvSpPr/>
+          <p:nvPr/>
+        </p:nvSpPr>
+        <p:spPr>
+          <a:xfrm>
+            <a:off x="2507672" y="3629892"/>
+            <a:ext cx="914400" cy="914400"/>
+          </a:xfrm>
+          <a:prstGeom prst="ellipse">
+            <a:avLst/>
+          </a:prstGeom>
+          <a:ln w="28575">
+            <a:solidFill>
+              <a:schemeClr val="tx1"/>
+            </a:solidFill>
+          </a:ln>
+        </p:spPr>
+        <p:style>
+          <a:lnRef idx="2">
+            <a:schemeClr val="accent6"/>
+          </a:lnRef>
+          <a:fillRef idx="1">
+            <a:schemeClr val="lt1"/>
+          </a:fillRef>
+          <a:effectRef idx="0">
+            <a:schemeClr val="accent6"/>
+          </a:effectRef>
+          <a:fontRef idx="minor">
+            <a:schemeClr val="dk1"/>
+          </a:fontRef>
+        </p:style>
+        <p:txBody>
+          <a:bodyPr rtlCol="0" anchor="ctr"/>
+          <a:lstStyle/>
+          <a:p>
+            <a:pPr algn="ctr"/>
+            <a:r>
+              <a:rPr lang="en-US" dirty="0" smtClean="0"/>
+              <a:t>F</a:t>
+            </a:r>
+            <a:endParaRPr lang="en-US" dirty="0"/>
+          </a:p>
+        </p:txBody>
+      </p:sp>
+      <p:sp>
+        <p:nvSpPr>
+          <p:cNvPr id="14" name="Oval 13"/>
+          <p:cNvSpPr/>
+          <p:nvPr/>
+        </p:nvSpPr>
+        <p:spPr>
+          <a:xfrm>
+            <a:off x="3726872" y="3629892"/>
+            <a:ext cx="914400" cy="914400"/>
+          </a:xfrm>
+          <a:prstGeom prst="ellipse">
+            <a:avLst/>
+          </a:prstGeom>
+          <a:ln w="28575">
+            <a:solidFill>
+              <a:schemeClr val="tx1"/>
+            </a:solidFill>
+          </a:ln>
+        </p:spPr>
+        <p:style>
+          <a:lnRef idx="2">
+            <a:schemeClr val="accent6"/>
+          </a:lnRef>
+          <a:fillRef idx="1">
+            <a:schemeClr val="lt1"/>
+          </a:fillRef>
+          <a:effectRef idx="0">
+            <a:schemeClr val="accent6"/>
+          </a:effectRef>
+          <a:fontRef idx="minor">
+            <a:schemeClr val="dk1"/>
+          </a:fontRef>
+        </p:style>
+        <p:txBody>
+          <a:bodyPr rtlCol="0" anchor="ctr"/>
+          <a:lstStyle/>
+          <a:p>
+            <a:pPr algn="ctr"/>
+            <a:r>
+              <a:rPr lang="en-US" dirty="0" smtClean="0"/>
+              <a:t>G</a:t>
+            </a:r>
+            <a:endParaRPr lang="en-US" dirty="0"/>
+          </a:p>
+        </p:txBody>
+      </p:sp>
+      <p:sp>
+        <p:nvSpPr>
+          <p:cNvPr id="16" name="Oval 15"/>
+          <p:cNvSpPr/>
+          <p:nvPr/>
+        </p:nvSpPr>
+        <p:spPr>
+          <a:xfrm>
+            <a:off x="5514108" y="3629892"/>
+            <a:ext cx="914400" cy="914400"/>
+          </a:xfrm>
+          <a:prstGeom prst="ellipse">
+            <a:avLst/>
+          </a:prstGeom>
+          <a:ln w="28575">
+            <a:solidFill>
+              <a:schemeClr val="tx1"/>
+            </a:solidFill>
+          </a:ln>
+        </p:spPr>
+        <p:style>
+          <a:lnRef idx="2">
+            <a:schemeClr val="accent6"/>
+          </a:lnRef>
+          <a:fillRef idx="1">
+            <a:schemeClr val="lt1"/>
+          </a:fillRef>
+          <a:effectRef idx="0">
+            <a:schemeClr val="accent6"/>
+          </a:effectRef>
+          <a:fontRef idx="minor">
+            <a:schemeClr val="dk1"/>
+          </a:fontRef>
+        </p:style>
+        <p:txBody>
+          <a:bodyPr rtlCol="0" anchor="ctr"/>
+          <a:lstStyle/>
+          <a:p>
+            <a:pPr algn="ctr"/>
+            <a:r>
+              <a:rPr lang="en-US" dirty="0"/>
+              <a:t>H</a:t>
+            </a:r>
+          </a:p>
+        </p:txBody>
+      </p:sp>
+      <p:sp>
+        <p:nvSpPr>
+          <p:cNvPr id="17" name="Oval 16"/>
+          <p:cNvSpPr/>
+          <p:nvPr/>
+        </p:nvSpPr>
+        <p:spPr>
+          <a:xfrm>
+            <a:off x="6733308" y="3629892"/>
+            <a:ext cx="914400" cy="914400"/>
+          </a:xfrm>
+          <a:prstGeom prst="ellipse">
+            <a:avLst/>
+          </a:prstGeom>
+          <a:ln w="28575">
+            <a:solidFill>
+              <a:schemeClr val="tx1"/>
+            </a:solidFill>
+          </a:ln>
+        </p:spPr>
+        <p:style>
+          <a:lnRef idx="2">
+            <a:schemeClr val="accent6"/>
+          </a:lnRef>
+          <a:fillRef idx="1">
+            <a:schemeClr val="lt1"/>
+          </a:fillRef>
+          <a:effectRef idx="0">
+            <a:schemeClr val="accent6"/>
+          </a:effectRef>
+          <a:fontRef idx="minor">
+            <a:schemeClr val="dk1"/>
+          </a:fontRef>
+        </p:style>
+        <p:txBody>
+          <a:bodyPr rtlCol="0" anchor="ctr"/>
+          <a:lstStyle/>
+          <a:p>
+            <a:pPr algn="ctr"/>
+            <a:r>
+              <a:rPr lang="en-US" dirty="0" smtClean="0"/>
+              <a:t>I</a:t>
+            </a:r>
+            <a:endParaRPr lang="en-US" dirty="0"/>
+          </a:p>
+        </p:txBody>
+      </p:sp>
+      <p:sp>
+        <p:nvSpPr>
+          <p:cNvPr id="18" name="Oval 17"/>
+          <p:cNvSpPr/>
+          <p:nvPr/>
+        </p:nvSpPr>
+        <p:spPr>
+          <a:xfrm>
+            <a:off x="7952508" y="3629892"/>
+            <a:ext cx="914400" cy="914400"/>
+          </a:xfrm>
+          <a:prstGeom prst="ellipse">
+            <a:avLst/>
+          </a:prstGeom>
+          <a:ln w="28575">
+            <a:solidFill>
+              <a:schemeClr val="tx1"/>
+            </a:solidFill>
+          </a:ln>
+        </p:spPr>
+        <p:style>
+          <a:lnRef idx="2">
+            <a:schemeClr val="accent6"/>
+          </a:lnRef>
+          <a:fillRef idx="1">
+            <a:schemeClr val="lt1"/>
+          </a:fillRef>
+          <a:effectRef idx="0">
+            <a:schemeClr val="accent6"/>
+          </a:effectRef>
+          <a:fontRef idx="minor">
+            <a:schemeClr val="dk1"/>
+          </a:fontRef>
+        </p:style>
+        <p:txBody>
+          <a:bodyPr rtlCol="0" anchor="ctr"/>
+          <a:lstStyle/>
+          <a:p>
+            <a:pPr algn="ctr"/>
+            <a:r>
+              <a:rPr lang="en-US" dirty="0" smtClean="0"/>
+              <a:t>J</a:t>
+            </a:r>
+            <a:endParaRPr lang="en-US" dirty="0"/>
+          </a:p>
+        </p:txBody>
+      </p:sp>
+      <p:sp>
+        <p:nvSpPr>
+          <p:cNvPr id="20" name="Oval 19"/>
+          <p:cNvSpPr/>
+          <p:nvPr/>
+        </p:nvSpPr>
+        <p:spPr>
+          <a:xfrm>
+            <a:off x="1856508" y="2216729"/>
+            <a:ext cx="914400" cy="914400"/>
+          </a:xfrm>
+          <a:prstGeom prst="ellipse">
+            <a:avLst/>
+          </a:prstGeom>
+          <a:ln w="28575">
+            <a:solidFill>
+              <a:schemeClr val="tx1"/>
+            </a:solidFill>
+          </a:ln>
+        </p:spPr>
+        <p:style>
+          <a:lnRef idx="2">
+            <a:schemeClr val="accent6"/>
+          </a:lnRef>
+          <a:fillRef idx="1">
+            <a:schemeClr val="lt1"/>
+          </a:fillRef>
+          <a:effectRef idx="0">
+            <a:schemeClr val="accent6"/>
+          </a:effectRef>
+          <a:fontRef idx="minor">
+            <a:schemeClr val="dk1"/>
+          </a:fontRef>
+        </p:style>
+        <p:txBody>
+          <a:bodyPr rtlCol="0" anchor="ctr"/>
+          <a:lstStyle/>
+          <a:p>
+            <a:pPr algn="ctr"/>
+            <a:r>
+              <a:rPr lang="en-US" dirty="0" smtClean="0"/>
+              <a:t>B</a:t>
+            </a:r>
+            <a:endParaRPr lang="en-US" dirty="0"/>
+          </a:p>
+        </p:txBody>
+      </p:sp>
+      <p:sp>
+        <p:nvSpPr>
+          <p:cNvPr id="22" name="Oval 21"/>
+          <p:cNvSpPr/>
+          <p:nvPr/>
+        </p:nvSpPr>
+        <p:spPr>
+          <a:xfrm>
+            <a:off x="4294908" y="2216729"/>
+            <a:ext cx="914400" cy="914400"/>
+          </a:xfrm>
+          <a:prstGeom prst="ellipse">
+            <a:avLst/>
+          </a:prstGeom>
+          <a:ln w="28575">
+            <a:solidFill>
+              <a:schemeClr val="tx1"/>
+            </a:solidFill>
+          </a:ln>
+        </p:spPr>
+        <p:style>
+          <a:lnRef idx="2">
+            <a:schemeClr val="accent6"/>
+          </a:lnRef>
+          <a:fillRef idx="1">
+            <a:schemeClr val="lt1"/>
+          </a:fillRef>
+          <a:effectRef idx="0">
+            <a:schemeClr val="accent6"/>
+          </a:effectRef>
+          <a:fontRef idx="minor">
+            <a:schemeClr val="dk1"/>
+          </a:fontRef>
+        </p:style>
+        <p:txBody>
+          <a:bodyPr rtlCol="0" anchor="ctr"/>
+          <a:lstStyle/>
+          <a:p>
+            <a:pPr algn="ctr"/>
+            <a:r>
+              <a:rPr lang="en-US" dirty="0" smtClean="0"/>
+              <a:t>C</a:t>
+            </a:r>
+            <a:endParaRPr lang="en-US" dirty="0"/>
+          </a:p>
+        </p:txBody>
+      </p:sp>
+      <p:sp>
+        <p:nvSpPr>
+          <p:cNvPr id="24" name="Oval 23"/>
+          <p:cNvSpPr/>
+          <p:nvPr/>
+        </p:nvSpPr>
+        <p:spPr>
+          <a:xfrm>
+            <a:off x="6733308" y="2216729"/>
+            <a:ext cx="914400" cy="914400"/>
+          </a:xfrm>
+          <a:prstGeom prst="ellipse">
+            <a:avLst/>
+          </a:prstGeom>
+          <a:ln w="28575">
+            <a:solidFill>
+              <a:schemeClr val="tx1"/>
+            </a:solidFill>
+          </a:ln>
+        </p:spPr>
+        <p:style>
+          <a:lnRef idx="2">
+            <a:schemeClr val="accent6"/>
+          </a:lnRef>
+          <a:fillRef idx="1">
+            <a:schemeClr val="lt1"/>
+          </a:fillRef>
+          <a:effectRef idx="0">
+            <a:schemeClr val="accent6"/>
+          </a:effectRef>
+          <a:fontRef idx="minor">
+            <a:schemeClr val="dk1"/>
+          </a:fontRef>
+        </p:style>
+        <p:txBody>
+          <a:bodyPr rtlCol="0" anchor="ctr"/>
+          <a:lstStyle/>
+          <a:p>
+            <a:pPr algn="ctr"/>
+            <a:r>
+              <a:rPr lang="en-US" dirty="0" smtClean="0"/>
+              <a:t>D</a:t>
+            </a:r>
+            <a:endParaRPr lang="en-US" dirty="0"/>
+          </a:p>
+        </p:txBody>
+      </p:sp>
+      <p:sp>
+        <p:nvSpPr>
+          <p:cNvPr id="30" name="Oval 29"/>
+          <p:cNvSpPr/>
+          <p:nvPr/>
+        </p:nvSpPr>
+        <p:spPr>
+          <a:xfrm>
+            <a:off x="4306445" y="803566"/>
+            <a:ext cx="914400" cy="914400"/>
+          </a:xfrm>
+          <a:prstGeom prst="ellipse">
+            <a:avLst/>
+          </a:prstGeom>
+          <a:ln w="28575">
+            <a:solidFill>
+              <a:schemeClr val="tx1"/>
+            </a:solidFill>
+          </a:ln>
+        </p:spPr>
+        <p:style>
+          <a:lnRef idx="2">
+            <a:schemeClr val="accent6"/>
+          </a:lnRef>
+          <a:fillRef idx="1">
+            <a:schemeClr val="lt1"/>
+          </a:fillRef>
+          <a:effectRef idx="0">
+            <a:schemeClr val="accent6"/>
+          </a:effectRef>
+          <a:fontRef idx="minor">
+            <a:schemeClr val="dk1"/>
+          </a:fontRef>
+        </p:style>
+        <p:txBody>
+          <a:bodyPr rtlCol="0" anchor="ctr"/>
+          <a:lstStyle/>
+          <a:p>
+            <a:pPr algn="ctr"/>
+            <a:r>
+              <a:rPr lang="en-US" smtClean="0"/>
+              <a:t>A</a:t>
+            </a:r>
+            <a:endParaRPr lang="en-US"/>
+          </a:p>
+        </p:txBody>
+      </p:sp>
+      <p:cxnSp>
+        <p:nvCxnSpPr>
+          <p:cNvPr id="45" name="Straight Connector 44"/>
+          <p:cNvCxnSpPr>
+            <a:stCxn id="30" idx="4"/>
+            <a:endCxn id="22" idx="0"/>
+          </p:cNvCxnSpPr>
+          <p:nvPr/>
+        </p:nvCxnSpPr>
+        <p:spPr>
+          <a:xfrm flipH="1">
+            <a:off x="4752108" y="1717966"/>
+            <a:ext cx="11537" cy="498763"/>
+          </a:xfrm>
+          <a:prstGeom prst="line">
+            <a:avLst/>
+          </a:prstGeom>
+          <a:ln w="25400">
+            <a:solidFill>
+              <a:schemeClr val="tx1"/>
+            </a:solidFill>
+          </a:ln>
+        </p:spPr>
+        <p:style>
+          <a:lnRef idx="1">
+            <a:schemeClr val="accent1"/>
+          </a:lnRef>
+          <a:fillRef idx="0">
+            <a:schemeClr val="accent1"/>
+          </a:fillRef>
+          <a:effectRef idx="0">
+            <a:schemeClr val="accent1"/>
+          </a:effectRef>
+          <a:fontRef idx="minor">
+            <a:schemeClr val="tx1"/>
+          </a:fontRef>
+        </p:style>
+      </p:cxnSp>
+      <p:cxnSp>
+        <p:nvCxnSpPr>
+          <p:cNvPr id="46" name="Straight Connector 45"/>
+          <p:cNvCxnSpPr>
+            <a:stCxn id="30" idx="5"/>
+            <a:endCxn id="24" idx="1"/>
+          </p:cNvCxnSpPr>
+          <p:nvPr/>
+        </p:nvCxnSpPr>
+        <p:spPr>
+          <a:xfrm>
+            <a:off x="5086934" y="1584055"/>
+            <a:ext cx="1780285" cy="766585"/>
+          </a:xfrm>
+          <a:prstGeom prst="line">
+            <a:avLst/>
+          </a:prstGeom>
+          <a:ln w="25400">
+            <a:solidFill>
+              <a:schemeClr val="tx1"/>
+            </a:solidFill>
+          </a:ln>
+        </p:spPr>
+        <p:style>
+          <a:lnRef idx="1">
+            <a:schemeClr val="accent1"/>
+          </a:lnRef>
+          <a:fillRef idx="0">
+            <a:schemeClr val="accent1"/>
+          </a:fillRef>
+          <a:effectRef idx="0">
+            <a:schemeClr val="accent1"/>
+          </a:effectRef>
+          <a:fontRef idx="minor">
+            <a:schemeClr val="tx1"/>
+          </a:fontRef>
+        </p:style>
+      </p:cxnSp>
+      <p:cxnSp>
+        <p:nvCxnSpPr>
+          <p:cNvPr id="49" name="Straight Connector 48"/>
+          <p:cNvCxnSpPr>
+            <a:stCxn id="30" idx="3"/>
+            <a:endCxn id="20" idx="7"/>
+          </p:cNvCxnSpPr>
+          <p:nvPr/>
+        </p:nvCxnSpPr>
+        <p:spPr>
+          <a:xfrm flipH="1">
+            <a:off x="2636997" y="1584055"/>
+            <a:ext cx="1803359" cy="766585"/>
+          </a:xfrm>
+          <a:prstGeom prst="line">
+            <a:avLst/>
+          </a:prstGeom>
+          <a:ln w="25400">
+            <a:solidFill>
+              <a:schemeClr val="tx1"/>
+            </a:solidFill>
+          </a:ln>
+        </p:spPr>
+        <p:style>
+          <a:lnRef idx="1">
+            <a:schemeClr val="accent1"/>
+          </a:lnRef>
+          <a:fillRef idx="0">
+            <a:schemeClr val="accent1"/>
+          </a:fillRef>
+          <a:effectRef idx="0">
+            <a:schemeClr val="accent1"/>
+          </a:effectRef>
+          <a:fontRef idx="minor">
+            <a:schemeClr val="tx1"/>
+          </a:fontRef>
+        </p:style>
+      </p:cxnSp>
+      <p:cxnSp>
+        <p:nvCxnSpPr>
+          <p:cNvPr id="52" name="Straight Connector 51"/>
+          <p:cNvCxnSpPr>
+            <a:stCxn id="20" idx="3"/>
+            <a:endCxn id="12" idx="0"/>
+          </p:cNvCxnSpPr>
+          <p:nvPr/>
+        </p:nvCxnSpPr>
+        <p:spPr>
+          <a:xfrm flipH="1">
+            <a:off x="1745672" y="2997218"/>
+            <a:ext cx="244747" cy="632674"/>
+          </a:xfrm>
+          <a:prstGeom prst="line">
+            <a:avLst/>
+          </a:prstGeom>
+          <a:ln w="25400">
+            <a:solidFill>
+              <a:schemeClr val="tx1"/>
+            </a:solidFill>
+          </a:ln>
+        </p:spPr>
+        <p:style>
+          <a:lnRef idx="1">
+            <a:schemeClr val="accent1"/>
+          </a:lnRef>
+          <a:fillRef idx="0">
+            <a:schemeClr val="accent1"/>
+          </a:fillRef>
+          <a:effectRef idx="0">
+            <a:schemeClr val="accent1"/>
+          </a:effectRef>
+          <a:fontRef idx="minor">
+            <a:schemeClr val="tx1"/>
+          </a:fontRef>
+        </p:style>
+      </p:cxnSp>
+      <p:cxnSp>
+        <p:nvCxnSpPr>
+          <p:cNvPr id="55" name="Straight Connector 54"/>
+          <p:cNvCxnSpPr>
+            <a:stCxn id="20" idx="5"/>
+            <a:endCxn id="13" idx="0"/>
+          </p:cNvCxnSpPr>
+          <p:nvPr/>
+        </p:nvCxnSpPr>
+        <p:spPr>
+          <a:xfrm>
+            <a:off x="2636997" y="2997218"/>
+            <a:ext cx="327875" cy="632674"/>
+          </a:xfrm>
+          <a:prstGeom prst="line">
+            <a:avLst/>
+          </a:prstGeom>
+          <a:ln w="25400">
+            <a:solidFill>
+              <a:schemeClr val="tx1"/>
+            </a:solidFill>
+          </a:ln>
+        </p:spPr>
+        <p:style>
+          <a:lnRef idx="1">
+            <a:schemeClr val="accent1"/>
+          </a:lnRef>
+          <a:fillRef idx="0">
+            <a:schemeClr val="accent1"/>
+          </a:fillRef>
+          <a:effectRef idx="0">
+            <a:schemeClr val="accent1"/>
+          </a:effectRef>
+          <a:fontRef idx="minor">
+            <a:schemeClr val="tx1"/>
+          </a:fontRef>
+        </p:style>
+      </p:cxnSp>
+      <p:cxnSp>
+        <p:nvCxnSpPr>
+          <p:cNvPr id="58" name="Straight Connector 57"/>
+          <p:cNvCxnSpPr>
+            <a:stCxn id="12" idx="3"/>
+            <a:endCxn id="4" idx="0"/>
+          </p:cNvCxnSpPr>
+          <p:nvPr/>
+        </p:nvCxnSpPr>
+        <p:spPr>
+          <a:xfrm flipH="1">
+            <a:off x="1177636" y="4410381"/>
+            <a:ext cx="244747" cy="632674"/>
+          </a:xfrm>
+          <a:prstGeom prst="line">
+            <a:avLst/>
+          </a:prstGeom>
+          <a:ln w="25400">
+            <a:solidFill>
+              <a:schemeClr val="tx1"/>
+            </a:solidFill>
+          </a:ln>
+        </p:spPr>
+        <p:style>
+          <a:lnRef idx="1">
+            <a:schemeClr val="accent1"/>
+          </a:lnRef>
+          <a:fillRef idx="0">
+            <a:schemeClr val="accent1"/>
+          </a:fillRef>
+          <a:effectRef idx="0">
+            <a:schemeClr val="accent1"/>
+          </a:effectRef>
+          <a:fontRef idx="minor">
+            <a:schemeClr val="tx1"/>
+          </a:fontRef>
+        </p:style>
+      </p:cxnSp>
+      <p:cxnSp>
+        <p:nvCxnSpPr>
+          <p:cNvPr id="61" name="Straight Connector 60"/>
+          <p:cNvCxnSpPr>
+            <a:stCxn id="12" idx="5"/>
+            <a:endCxn id="5" idx="0"/>
+          </p:cNvCxnSpPr>
+          <p:nvPr/>
+        </p:nvCxnSpPr>
+        <p:spPr>
+          <a:xfrm>
+            <a:off x="2068961" y="4410381"/>
+            <a:ext cx="327875" cy="632674"/>
+          </a:xfrm>
+          <a:prstGeom prst="line">
+            <a:avLst/>
+          </a:prstGeom>
+          <a:ln w="25400">
+            <a:solidFill>
+              <a:schemeClr val="tx1"/>
+            </a:solidFill>
+          </a:ln>
+        </p:spPr>
+        <p:style>
+          <a:lnRef idx="1">
+            <a:schemeClr val="accent1"/>
+          </a:lnRef>
+          <a:fillRef idx="0">
+            <a:schemeClr val="accent1"/>
+          </a:fillRef>
+          <a:effectRef idx="0">
+            <a:schemeClr val="accent1"/>
+          </a:effectRef>
+          <a:fontRef idx="minor">
+            <a:schemeClr val="tx1"/>
+          </a:fontRef>
+        </p:style>
+      </p:cxnSp>
+      <p:cxnSp>
+        <p:nvCxnSpPr>
+          <p:cNvPr id="64" name="Straight Connector 63"/>
+          <p:cNvCxnSpPr>
+            <a:stCxn id="22" idx="3"/>
+            <a:endCxn id="14" idx="0"/>
+          </p:cNvCxnSpPr>
+          <p:nvPr/>
+        </p:nvCxnSpPr>
+        <p:spPr>
+          <a:xfrm flipH="1">
+            <a:off x="4184072" y="2997218"/>
+            <a:ext cx="244747" cy="632674"/>
+          </a:xfrm>
+          <a:prstGeom prst="line">
+            <a:avLst/>
+          </a:prstGeom>
+          <a:ln w="25400">
+            <a:solidFill>
+              <a:schemeClr val="tx1"/>
+            </a:solidFill>
+          </a:ln>
+        </p:spPr>
+        <p:style>
+          <a:lnRef idx="1">
+            <a:schemeClr val="accent1"/>
+          </a:lnRef>
+          <a:fillRef idx="0">
+            <a:schemeClr val="accent1"/>
+          </a:fillRef>
+          <a:effectRef idx="0">
+            <a:schemeClr val="accent1"/>
+          </a:effectRef>
+          <a:fontRef idx="minor">
+            <a:schemeClr val="tx1"/>
+          </a:fontRef>
+        </p:style>
+      </p:cxnSp>
+      <p:cxnSp>
+        <p:nvCxnSpPr>
+          <p:cNvPr id="67" name="Straight Connector 66"/>
+          <p:cNvCxnSpPr>
+            <a:stCxn id="24" idx="3"/>
+            <a:endCxn id="16" idx="0"/>
+          </p:cNvCxnSpPr>
+          <p:nvPr/>
+        </p:nvCxnSpPr>
+        <p:spPr>
+          <a:xfrm flipH="1">
+            <a:off x="5971308" y="2997218"/>
+            <a:ext cx="895911" cy="632674"/>
+          </a:xfrm>
+          <a:prstGeom prst="line">
+            <a:avLst/>
+          </a:prstGeom>
+          <a:ln w="25400">
+            <a:solidFill>
+              <a:schemeClr val="tx1"/>
+            </a:solidFill>
+          </a:ln>
+        </p:spPr>
+        <p:style>
+          <a:lnRef idx="1">
+            <a:schemeClr val="accent1"/>
+          </a:lnRef>
+          <a:fillRef idx="0">
+            <a:schemeClr val="accent1"/>
+          </a:fillRef>
+          <a:effectRef idx="0">
+            <a:schemeClr val="accent1"/>
+          </a:effectRef>
+          <a:fontRef idx="minor">
+            <a:schemeClr val="tx1"/>
+          </a:fontRef>
+        </p:style>
+      </p:cxnSp>
+      <p:cxnSp>
+        <p:nvCxnSpPr>
+          <p:cNvPr id="70" name="Straight Connector 69"/>
+          <p:cNvCxnSpPr>
+            <a:stCxn id="24" idx="5"/>
+            <a:endCxn id="18" idx="0"/>
+          </p:cNvCxnSpPr>
+          <p:nvPr/>
+        </p:nvCxnSpPr>
+        <p:spPr>
+          <a:xfrm>
+            <a:off x="7513797" y="2997218"/>
+            <a:ext cx="895911" cy="632674"/>
+          </a:xfrm>
+          <a:prstGeom prst="line">
+            <a:avLst/>
+          </a:prstGeom>
+          <a:ln w="25400">
+            <a:solidFill>
+              <a:schemeClr val="tx1"/>
+            </a:solidFill>
+          </a:ln>
+        </p:spPr>
+        <p:style>
+          <a:lnRef idx="1">
+            <a:schemeClr val="accent1"/>
+          </a:lnRef>
+          <a:fillRef idx="0">
+            <a:schemeClr val="accent1"/>
+          </a:fillRef>
+          <a:effectRef idx="0">
+            <a:schemeClr val="accent1"/>
+          </a:effectRef>
+          <a:fontRef idx="minor">
+            <a:schemeClr val="tx1"/>
+          </a:fontRef>
+        </p:style>
+      </p:cxnSp>
+      <p:cxnSp>
+        <p:nvCxnSpPr>
+          <p:cNvPr id="74" name="Straight Connector 73"/>
+          <p:cNvCxnSpPr>
+            <a:stCxn id="24" idx="4"/>
+            <a:endCxn id="17" idx="0"/>
+          </p:cNvCxnSpPr>
+          <p:nvPr/>
+        </p:nvCxnSpPr>
+        <p:spPr>
+          <a:xfrm>
+            <a:off x="7190508" y="3131129"/>
+            <a:ext cx="0" cy="498763"/>
+          </a:xfrm>
+          <a:prstGeom prst="line">
+            <a:avLst/>
+          </a:prstGeom>
+          <a:ln w="25400">
+            <a:solidFill>
+              <a:schemeClr val="tx1"/>
+            </a:solidFill>
+          </a:ln>
+        </p:spPr>
+        <p:style>
+          <a:lnRef idx="1">
+            <a:schemeClr val="accent1"/>
+          </a:lnRef>
+          <a:fillRef idx="0">
+            <a:schemeClr val="accent1"/>
+          </a:fillRef>
+          <a:effectRef idx="0">
+            <a:schemeClr val="accent1"/>
+          </a:effectRef>
+          <a:fontRef idx="minor">
+            <a:schemeClr val="tx1"/>
+          </a:fontRef>
+        </p:style>
+      </p:cxnSp>
+      <p:cxnSp>
+        <p:nvCxnSpPr>
+          <p:cNvPr id="77" name="Straight Connector 76"/>
+          <p:cNvCxnSpPr>
+            <a:stCxn id="16" idx="3"/>
+            <a:endCxn id="8" idx="0"/>
+          </p:cNvCxnSpPr>
+          <p:nvPr/>
+        </p:nvCxnSpPr>
+        <p:spPr>
+          <a:xfrm flipH="1">
+            <a:off x="5403272" y="4410381"/>
+            <a:ext cx="244747" cy="632674"/>
+          </a:xfrm>
+          <a:prstGeom prst="line">
+            <a:avLst/>
+          </a:prstGeom>
+          <a:ln w="25400">
+            <a:solidFill>
+              <a:schemeClr val="tx1"/>
+            </a:solidFill>
+          </a:ln>
+        </p:spPr>
+        <p:style>
+          <a:lnRef idx="1">
+            <a:schemeClr val="accent1"/>
+          </a:lnRef>
+          <a:fillRef idx="0">
+            <a:schemeClr val="accent1"/>
+          </a:fillRef>
+          <a:effectRef idx="0">
+            <a:schemeClr val="accent1"/>
+          </a:effectRef>
+          <a:fontRef idx="minor">
+            <a:schemeClr val="tx1"/>
+          </a:fontRef>
+        </p:style>
+      </p:cxnSp>
+      <p:sp>
+        <p:nvSpPr>
+          <p:cNvPr id="91" name="TextBox 90"/>
+          <p:cNvSpPr txBox="1"/>
+          <p:nvPr/>
+        </p:nvSpPr>
+        <p:spPr>
+          <a:xfrm>
+            <a:off x="9171707" y="485095"/>
+            <a:ext cx="667427" cy="369332"/>
+          </a:xfrm>
+          <a:prstGeom prst="rect">
+            <a:avLst/>
+          </a:prstGeom>
+          <a:noFill/>
+        </p:spPr>
+        <p:txBody>
+          <a:bodyPr wrap="none" rtlCol="0">
+            <a:spAutoFit/>
+          </a:bodyPr>
+          <a:lstStyle/>
+          <a:p>
+            <a:r>
+              <a:rPr lang="en-US" dirty="0" smtClean="0"/>
+              <a:t>Level</a:t>
+            </a:r>
+            <a:endParaRPr lang="en-US" dirty="0"/>
+          </a:p>
+        </p:txBody>
+      </p:sp>
+    </p:spTree>
+    <p:extLst>
+      <p:ext uri="{BB962C8B-B14F-4D97-AF65-F5344CB8AC3E}">
+        <p14:creationId xmlns:p14="http://schemas.microsoft.com/office/powerpoint/2010/main" val="1044218633"/>
+      </p:ext>
+    </p:extLst>
+  </p:cSld>
+  <p:clrMapOvr>
+    <a:masterClrMapping/>
+  </p:clrMapOvr>
+</p:sld>
+</file>
+
 <file path=ppt/slides/slide5.xml><?xml version="1.0" encoding="utf-8"?>
 <p:sld xmlns:a="http://schemas.openxmlformats.org/drawingml/2006/main" xmlns:r="http://schemas.openxmlformats.org/officeDocument/2006/relationships" xmlns:p="http://schemas.openxmlformats.org/presentationml/2006/main">
   <p:cSld>

</xml_diff>